<commit_message>
Präsi: GUI und Parameter drin
</commit_message>
<xml_diff>
--- a/evolotionaereAlgorithmen/trunk/SystemOfEquations/Ergebnisse/Präsi/Einführung.pptx
+++ b/evolotionaereAlgorithmen/trunk/SystemOfEquations/Ergebnisse/Präsi/Einführung.pptx
@@ -5178,8 +5178,8 @@
         </p:blipFill>
         <p:spPr bwMode="auto">
           <a:xfrm>
-            <a:off x="1547664" y="1530465"/>
-            <a:ext cx="7020565" cy="5265424"/>
+            <a:off x="1547664" y="1556793"/>
+            <a:ext cx="7020565" cy="5239096"/>
           </a:xfrm>
           <a:prstGeom prst="rect">
             <a:avLst/>
@@ -6148,30 +6148,36 @@
           </a:p>
         </p:txBody>
       </p:sp>
-      <p:sp>
-        <p:nvSpPr>
-          <p:cNvPr id="71" name="Shape 71"/>
-          <p:cNvSpPr>
-            <a:spLocks noChangeAspect="1"/>
-          </p:cNvSpPr>
+      <p:pic>
+        <p:nvPicPr>
+          <p:cNvPr id="2" name="Grafik 1"/>
+          <p:cNvPicPr>
+            <a:picLocks noChangeAspect="1"/>
+          </p:cNvPicPr>
           <p:nvPr/>
-        </p:nvSpPr>
+        </p:nvPicPr>
+        <p:blipFill>
+          <a:blip r:embed="rId3">
+            <a:extLst>
+              <a:ext uri="{28A0092B-C50C-407E-A947-70E740481C1C}">
+                <a14:useLocalDpi xmlns:a14="http://schemas.microsoft.com/office/drawing/2010/main" val="0"/>
+              </a:ext>
+            </a:extLst>
+          </a:blip>
+          <a:stretch>
+            <a:fillRect/>
+          </a:stretch>
+        </p:blipFill>
         <p:spPr>
           <a:xfrm>
-            <a:off x="971600" y="2712767"/>
-            <a:ext cx="7261794" cy="4136426"/>
+            <a:off x="926486" y="2721574"/>
+            <a:ext cx="7352022" cy="4136426"/>
           </a:xfrm>
           <a:prstGeom prst="rect">
             <a:avLst/>
           </a:prstGeom>
-          <a:blipFill>
-            <a:blip r:embed="rId3"/>
-            <a:stretch>
-              <a:fillRect/>
-            </a:stretch>
-          </a:blipFill>
-        </p:spPr>
-      </p:sp>
+        </p:spPr>
+      </p:pic>
     </p:spTree>
   </p:cSld>
   <p:clrMapOvr>
@@ -6678,7 +6684,7 @@
               <a:buNone/>
             </a:pPr>
             <a:r>
-              <a:rPr lang="de"/>
+              <a:rPr lang="de" dirty="0"/>
               <a:t>Verhalten Griewank</a:t>
             </a:r>
           </a:p>
@@ -6867,8 +6873,8 @@
         </p:blipFill>
         <p:spPr bwMode="auto">
           <a:xfrm>
-            <a:off x="1057434" y="1340768"/>
-            <a:ext cx="7220475" cy="5415356"/>
+            <a:off x="1057434" y="1556792"/>
+            <a:ext cx="7220475" cy="5301208"/>
           </a:xfrm>
           <a:prstGeom prst="rect">
             <a:avLst/>
@@ -6908,7 +6914,7 @@
         </p:blipFill>
         <p:spPr bwMode="auto">
           <a:xfrm>
-            <a:off x="-11097" y="1340768"/>
+            <a:off x="25349" y="1556792"/>
             <a:ext cx="4727113" cy="432048"/>
           </a:xfrm>
           <a:prstGeom prst="rect">

</xml_diff>